<commit_message>
Added InkPath QR code
</commit_message>
<xml_diff>
--- a/Intro_to_Data_Vis_in_R_slides.pptx
+++ b/Intro_to_Data_Vis_in_R_slides.pptx
@@ -22,6 +22,7 @@
     <p:sldId id="419" r:id="rId16"/>
     <p:sldId id="375" r:id="rId17"/>
     <p:sldId id="405" r:id="rId18"/>
+    <p:sldId id="420" r:id="rId19"/>
   </p:sldIdLst>
   <p:sldSz cx="12192000" cy="6858000"/>
   <p:notesSz cx="6858000" cy="9144000"/>
@@ -128,38 +129,15 @@
 </p:presentation>
 </file>
 
-<file path=ppt/revisionInfo.xml><?xml version="1.0" encoding="utf-8"?>
-<p1510:revInfo xmlns:a="http://schemas.openxmlformats.org/drawingml/2006/main" xmlns:r="http://schemas.openxmlformats.org/officeDocument/2006/relationships" xmlns:p1510="http://schemas.microsoft.com/office/powerpoint/2015/10/main">
-  <p1510:revLst>
-    <p1510:client id="{3F3964E0-232B-46E6-A372-0BA88EAEC6EA}" v="1" dt="2025-11-05T16:19:37.708"/>
-  </p1510:revLst>
-</p1510:revInfo>
-</file>
-
 <file path=ppt/changesInfos/changesInfo1.xml><?xml version="1.0" encoding="utf-8"?>
 <pc:chgInfo xmlns:a="http://schemas.openxmlformats.org/drawingml/2006/main" xmlns:r="http://schemas.openxmlformats.org/officeDocument/2006/relationships" xmlns:ac="http://schemas.microsoft.com/office/drawing/2013/main/command" xmlns:pc="http://schemas.microsoft.com/office/powerpoint/2013/main/command">
   <pc:docChgLst>
     <pc:chgData name="Korochkina, Maria" userId="c909cca0-0566-42e0-8dc0-791f330c8ce2" providerId="ADAL" clId="{97825DE4-A198-468F-898D-C5BD5F984618}"/>
     <pc:docChg chg="undo custSel addSld delSld modSld sldOrd">
-      <pc:chgData name="Korochkina, Maria" userId="c909cca0-0566-42e0-8dc0-791f330c8ce2" providerId="ADAL" clId="{97825DE4-A198-468F-898D-C5BD5F984618}" dt="2025-11-05T16:21:20.874" v="1653" actId="255"/>
+      <pc:chgData name="Korochkina, Maria" userId="c909cca0-0566-42e0-8dc0-791f330c8ce2" providerId="ADAL" clId="{97825DE4-A198-468F-898D-C5BD5F984618}" dt="2025-11-18T09:42:41.592" v="1659" actId="14100"/>
       <pc:docMkLst>
         <pc:docMk/>
       </pc:docMkLst>
-      <pc:sldChg chg="modSp add mod">
-        <pc:chgData name="Korochkina, Maria" userId="c909cca0-0566-42e0-8dc0-791f330c8ce2" providerId="ADAL" clId="{97825DE4-A198-468F-898D-C5BD5F984618}" dt="2025-10-14T15:26:50.927" v="23" actId="20577"/>
-        <pc:sldMkLst>
-          <pc:docMk/>
-          <pc:sldMk cId="307993976" sldId="264"/>
-        </pc:sldMkLst>
-        <pc:spChg chg="mod">
-          <ac:chgData name="Korochkina, Maria" userId="c909cca0-0566-42e0-8dc0-791f330c8ce2" providerId="ADAL" clId="{97825DE4-A198-468F-898D-C5BD5F984618}" dt="2025-10-14T15:26:50.927" v="23" actId="20577"/>
-          <ac:spMkLst>
-            <pc:docMk/>
-            <pc:sldMk cId="307993976" sldId="264"/>
-            <ac:spMk id="2" creationId="{EBDFC52C-02B7-FF58-DBFA-D146D095E8F7}"/>
-          </ac:spMkLst>
-        </pc:spChg>
-      </pc:sldChg>
       <pc:sldChg chg="modSp add mod">
         <pc:chgData name="Korochkina, Maria" userId="c909cca0-0566-42e0-8dc0-791f330c8ce2" providerId="ADAL" clId="{97825DE4-A198-468F-898D-C5BD5F984618}" dt="2025-11-05T16:21:20.874" v="1653" actId="255"/>
         <pc:sldMkLst>
@@ -175,380 +153,18 @@
           </ac:spMkLst>
         </pc:spChg>
       </pc:sldChg>
-      <pc:sldChg chg="add">
-        <pc:chgData name="Korochkina, Maria" userId="c909cca0-0566-42e0-8dc0-791f330c8ce2" providerId="ADAL" clId="{97825DE4-A198-468F-898D-C5BD5F984618}" dt="2025-10-14T15:23:42.611" v="3"/>
+      <pc:sldChg chg="addSp modSp new mod">
+        <pc:chgData name="Korochkina, Maria" userId="c909cca0-0566-42e0-8dc0-791f330c8ce2" providerId="ADAL" clId="{97825DE4-A198-468F-898D-C5BD5F984618}" dt="2025-11-18T09:42:41.592" v="1659" actId="14100"/>
         <pc:sldMkLst>
           <pc:docMk/>
-          <pc:sldMk cId="3564412488" sldId="405"/>
+          <pc:sldMk cId="1046865679" sldId="420"/>
         </pc:sldMkLst>
-      </pc:sldChg>
-      <pc:sldChg chg="addSp modSp new mod">
-        <pc:chgData name="Korochkina, Maria" userId="c909cca0-0566-42e0-8dc0-791f330c8ce2" providerId="ADAL" clId="{97825DE4-A198-468F-898D-C5BD5F984618}" dt="2025-10-14T15:46:18.126" v="74" actId="1076"/>
-        <pc:sldMkLst>
-          <pc:docMk/>
-          <pc:sldMk cId="196464737" sldId="406"/>
-        </pc:sldMkLst>
-        <pc:spChg chg="add mod">
-          <ac:chgData name="Korochkina, Maria" userId="c909cca0-0566-42e0-8dc0-791f330c8ce2" providerId="ADAL" clId="{97825DE4-A198-468F-898D-C5BD5F984618}" dt="2025-10-14T15:46:18.126" v="74" actId="1076"/>
-          <ac:spMkLst>
-            <pc:docMk/>
-            <pc:sldMk cId="196464737" sldId="406"/>
-            <ac:spMk id="2" creationId="{48AF5810-86BA-9456-1D53-D13B589E0F5A}"/>
-          </ac:spMkLst>
-        </pc:spChg>
-      </pc:sldChg>
-      <pc:sldChg chg="addSp delSp modSp new mod">
-        <pc:chgData name="Korochkina, Maria" userId="c909cca0-0566-42e0-8dc0-791f330c8ce2" providerId="ADAL" clId="{97825DE4-A198-468F-898D-C5BD5F984618}" dt="2025-10-14T17:01:45.575" v="1621"/>
-        <pc:sldMkLst>
-          <pc:docMk/>
-          <pc:sldMk cId="2711172357" sldId="407"/>
-        </pc:sldMkLst>
-        <pc:spChg chg="mod">
-          <ac:chgData name="Korochkina, Maria" userId="c909cca0-0566-42e0-8dc0-791f330c8ce2" providerId="ADAL" clId="{97825DE4-A198-468F-898D-C5BD5F984618}" dt="2025-10-14T16:20:53.737" v="987" actId="20577"/>
-          <ac:spMkLst>
-            <pc:docMk/>
-            <pc:sldMk cId="2711172357" sldId="407"/>
-            <ac:spMk id="2" creationId="{7FCE2A88-43EA-7B26-71D8-7B07B3D9A620}"/>
-          </ac:spMkLst>
-        </pc:spChg>
-        <pc:spChg chg="add mod">
-          <ac:chgData name="Korochkina, Maria" userId="c909cca0-0566-42e0-8dc0-791f330c8ce2" providerId="ADAL" clId="{97825DE4-A198-468F-898D-C5BD5F984618}" dt="2025-10-14T17:01:45.575" v="1621"/>
-          <ac:spMkLst>
-            <pc:docMk/>
-            <pc:sldMk cId="2711172357" sldId="407"/>
-            <ac:spMk id="7" creationId="{F676AC0E-EA91-1CCE-0147-945F87B90447}"/>
-          </ac:spMkLst>
-        </pc:spChg>
-        <pc:picChg chg="add mod modCrop">
-          <ac:chgData name="Korochkina, Maria" userId="c909cca0-0566-42e0-8dc0-791f330c8ce2" providerId="ADAL" clId="{97825DE4-A198-468F-898D-C5BD5F984618}" dt="2025-10-14T15:55:54.734" v="104" actId="1076"/>
+        <pc:picChg chg="add mod">
+          <ac:chgData name="Korochkina, Maria" userId="c909cca0-0566-42e0-8dc0-791f330c8ce2" providerId="ADAL" clId="{97825DE4-A198-468F-898D-C5BD5F984618}" dt="2025-11-18T09:42:41.592" v="1659" actId="14100"/>
           <ac:picMkLst>
             <pc:docMk/>
-            <pc:sldMk cId="2711172357" sldId="407"/>
-            <ac:picMk id="6" creationId="{10C8AB45-9CAA-B218-7491-73A608243CD0}"/>
-          </ac:picMkLst>
-        </pc:picChg>
-      </pc:sldChg>
-      <pc:sldChg chg="addSp modSp add mod">
-        <pc:chgData name="Korochkina, Maria" userId="c909cca0-0566-42e0-8dc0-791f330c8ce2" providerId="ADAL" clId="{97825DE4-A198-468F-898D-C5BD5F984618}" dt="2025-10-14T17:01:36.788" v="1617"/>
-        <pc:sldMkLst>
-          <pc:docMk/>
-          <pc:sldMk cId="3173958969" sldId="408"/>
-        </pc:sldMkLst>
-        <pc:spChg chg="mod">
-          <ac:chgData name="Korochkina, Maria" userId="c909cca0-0566-42e0-8dc0-791f330c8ce2" providerId="ADAL" clId="{97825DE4-A198-468F-898D-C5BD5F984618}" dt="2025-10-14T16:43:54.691" v="1177" actId="20577"/>
-          <ac:spMkLst>
-            <pc:docMk/>
-            <pc:sldMk cId="3173958969" sldId="408"/>
-            <ac:spMk id="2" creationId="{545BA2FE-15F0-C356-3666-DE4F3374AED5}"/>
-          </ac:spMkLst>
-        </pc:spChg>
-        <pc:spChg chg="add mod">
-          <ac:chgData name="Korochkina, Maria" userId="c909cca0-0566-42e0-8dc0-791f330c8ce2" providerId="ADAL" clId="{97825DE4-A198-468F-898D-C5BD5F984618}" dt="2025-10-14T17:01:36.788" v="1617"/>
-          <ac:spMkLst>
-            <pc:docMk/>
-            <pc:sldMk cId="3173958969" sldId="408"/>
-            <ac:spMk id="3" creationId="{4BDC2328-4502-DBED-629F-090262A3D719}"/>
-          </ac:spMkLst>
-        </pc:spChg>
-        <pc:picChg chg="mod">
-          <ac:chgData name="Korochkina, Maria" userId="c909cca0-0566-42e0-8dc0-791f330c8ce2" providerId="ADAL" clId="{97825DE4-A198-468F-898D-C5BD5F984618}" dt="2025-10-14T16:43:50.286" v="1166" actId="1076"/>
-          <ac:picMkLst>
-            <pc:docMk/>
-            <pc:sldMk cId="3173958969" sldId="408"/>
-            <ac:picMk id="4" creationId="{022FF576-DA21-BBBF-CC59-BB943F663948}"/>
-          </ac:picMkLst>
-        </pc:picChg>
-      </pc:sldChg>
-      <pc:sldChg chg="addSp delSp modSp add mod">
-        <pc:chgData name="Korochkina, Maria" userId="c909cca0-0566-42e0-8dc0-791f330c8ce2" providerId="ADAL" clId="{97825DE4-A198-468F-898D-C5BD5F984618}" dt="2025-10-14T17:01:43.335" v="1620"/>
-        <pc:sldMkLst>
-          <pc:docMk/>
-          <pc:sldMk cId="3499783830" sldId="409"/>
-        </pc:sldMkLst>
-        <pc:spChg chg="mod">
-          <ac:chgData name="Korochkina, Maria" userId="c909cca0-0566-42e0-8dc0-791f330c8ce2" providerId="ADAL" clId="{97825DE4-A198-468F-898D-C5BD5F984618}" dt="2025-10-14T16:21:11.673" v="1035" actId="20577"/>
-          <ac:spMkLst>
-            <pc:docMk/>
-            <pc:sldMk cId="3499783830" sldId="409"/>
-            <ac:spMk id="2" creationId="{287FCFAA-9ACA-6BED-5D9C-722E98AF6BD0}"/>
-          </ac:spMkLst>
-        </pc:spChg>
-        <pc:spChg chg="add mod">
-          <ac:chgData name="Korochkina, Maria" userId="c909cca0-0566-42e0-8dc0-791f330c8ce2" providerId="ADAL" clId="{97825DE4-A198-468F-898D-C5BD5F984618}" dt="2025-10-14T17:01:43.335" v="1620"/>
-          <ac:spMkLst>
-            <pc:docMk/>
-            <pc:sldMk cId="3499783830" sldId="409"/>
-            <ac:spMk id="3" creationId="{90334262-A6AE-A126-1CFD-B8254B42F90A}"/>
-          </ac:spMkLst>
-        </pc:spChg>
-        <pc:picChg chg="add mod">
-          <ac:chgData name="Korochkina, Maria" userId="c909cca0-0566-42e0-8dc0-791f330c8ce2" providerId="ADAL" clId="{97825DE4-A198-468F-898D-C5BD5F984618}" dt="2025-10-14T16:20:39.995" v="955" actId="1076"/>
-          <ac:picMkLst>
-            <pc:docMk/>
-            <pc:sldMk cId="3499783830" sldId="409"/>
-            <ac:picMk id="1026" creationId="{6E479E23-40B3-ED36-8330-BC93FE87B1C8}"/>
-          </ac:picMkLst>
-        </pc:picChg>
-      </pc:sldChg>
-      <pc:sldChg chg="modSp new mod modAnim">
-        <pc:chgData name="Korochkina, Maria" userId="c909cca0-0566-42e0-8dc0-791f330c8ce2" providerId="ADAL" clId="{97825DE4-A198-468F-898D-C5BD5F984618}" dt="2025-10-14T17:03:06.058" v="1633"/>
-        <pc:sldMkLst>
-          <pc:docMk/>
-          <pc:sldMk cId="461221306" sldId="410"/>
-        </pc:sldMkLst>
-        <pc:spChg chg="mod">
-          <ac:chgData name="Korochkina, Maria" userId="c909cca0-0566-42e0-8dc0-791f330c8ce2" providerId="ADAL" clId="{97825DE4-A198-468F-898D-C5BD5F984618}" dt="2025-10-14T16:02:35.057" v="129" actId="2711"/>
-          <ac:spMkLst>
-            <pc:docMk/>
-            <pc:sldMk cId="461221306" sldId="410"/>
-            <ac:spMk id="2" creationId="{823BB0D8-FFF0-E4F8-56C3-80F7B5527919}"/>
-          </ac:spMkLst>
-        </pc:spChg>
-        <pc:spChg chg="mod">
-          <ac:chgData name="Korochkina, Maria" userId="c909cca0-0566-42e0-8dc0-791f330c8ce2" providerId="ADAL" clId="{97825DE4-A198-468F-898D-C5BD5F984618}" dt="2025-10-14T16:18:56.578" v="945" actId="1076"/>
-          <ac:spMkLst>
-            <pc:docMk/>
-            <pc:sldMk cId="461221306" sldId="410"/>
-            <ac:spMk id="3" creationId="{5B6E7FAE-1FD8-260D-DF6C-71659335B47B}"/>
-          </ac:spMkLst>
-        </pc:spChg>
-      </pc:sldChg>
-      <pc:sldChg chg="addSp delSp modSp add mod">
-        <pc:chgData name="Korochkina, Maria" userId="c909cca0-0566-42e0-8dc0-791f330c8ce2" providerId="ADAL" clId="{97825DE4-A198-468F-898D-C5BD5F984618}" dt="2025-10-14T17:01:40.965" v="1619"/>
-        <pc:sldMkLst>
-          <pc:docMk/>
-          <pc:sldMk cId="1416815825" sldId="411"/>
-        </pc:sldMkLst>
-        <pc:spChg chg="mod">
-          <ac:chgData name="Korochkina, Maria" userId="c909cca0-0566-42e0-8dc0-791f330c8ce2" providerId="ADAL" clId="{97825DE4-A198-468F-898D-C5BD5F984618}" dt="2025-10-14T16:42:30.486" v="1086" actId="20577"/>
-          <ac:spMkLst>
-            <pc:docMk/>
-            <pc:sldMk cId="1416815825" sldId="411"/>
-            <ac:spMk id="2" creationId="{395F5506-697F-CD23-3F7B-C25AFF0813C9}"/>
-          </ac:spMkLst>
-        </pc:spChg>
-        <pc:spChg chg="add mod">
-          <ac:chgData name="Korochkina, Maria" userId="c909cca0-0566-42e0-8dc0-791f330c8ce2" providerId="ADAL" clId="{97825DE4-A198-468F-898D-C5BD5F984618}" dt="2025-10-14T17:01:40.965" v="1619"/>
-          <ac:spMkLst>
-            <pc:docMk/>
-            <pc:sldMk cId="1416815825" sldId="411"/>
-            <ac:spMk id="5" creationId="{A8D95066-325D-97DC-B702-3784A45E727E}"/>
-          </ac:spMkLst>
-        </pc:spChg>
-        <pc:picChg chg="add mod ord modCrop">
-          <ac:chgData name="Korochkina, Maria" userId="c909cca0-0566-42e0-8dc0-791f330c8ce2" providerId="ADAL" clId="{97825DE4-A198-468F-898D-C5BD5F984618}" dt="2025-10-14T16:43:08.517" v="1095" actId="1076"/>
-          <ac:picMkLst>
-            <pc:docMk/>
-            <pc:sldMk cId="1416815825" sldId="411"/>
-            <ac:picMk id="4" creationId="{AEAE242F-1E97-9B17-DA8B-15AE23AF87CD}"/>
-          </ac:picMkLst>
-        </pc:picChg>
-      </pc:sldChg>
-      <pc:sldChg chg="addSp modSp add mod">
-        <pc:chgData name="Korochkina, Maria" userId="c909cca0-0566-42e0-8dc0-791f330c8ce2" providerId="ADAL" clId="{97825DE4-A198-468F-898D-C5BD5F984618}" dt="2025-10-14T17:01:38.856" v="1618"/>
-        <pc:sldMkLst>
-          <pc:docMk/>
-          <pc:sldMk cId="3869932994" sldId="412"/>
-        </pc:sldMkLst>
-        <pc:spChg chg="mod">
-          <ac:chgData name="Korochkina, Maria" userId="c909cca0-0566-42e0-8dc0-791f330c8ce2" providerId="ADAL" clId="{97825DE4-A198-468F-898D-C5BD5F984618}" dt="2025-10-14T16:43:35.054" v="1150" actId="20577"/>
-          <ac:spMkLst>
-            <pc:docMk/>
-            <pc:sldMk cId="3869932994" sldId="412"/>
-            <ac:spMk id="2" creationId="{472E4215-4FF4-0ED9-AC63-C6D628139A6C}"/>
-          </ac:spMkLst>
-        </pc:spChg>
-        <pc:spChg chg="add mod">
-          <ac:chgData name="Korochkina, Maria" userId="c909cca0-0566-42e0-8dc0-791f330c8ce2" providerId="ADAL" clId="{97825DE4-A198-468F-898D-C5BD5F984618}" dt="2025-10-14T17:01:38.856" v="1618"/>
-          <ac:spMkLst>
-            <pc:docMk/>
-            <pc:sldMk cId="3869932994" sldId="412"/>
-            <ac:spMk id="3" creationId="{88708364-DC8B-8DED-D14D-91B6E14D81B0}"/>
-          </ac:spMkLst>
-        </pc:spChg>
-      </pc:sldChg>
-      <pc:sldChg chg="addSp delSp modSp add mod">
-        <pc:chgData name="Korochkina, Maria" userId="c909cca0-0566-42e0-8dc0-791f330c8ce2" providerId="ADAL" clId="{97825DE4-A198-468F-898D-C5BD5F984618}" dt="2025-10-14T17:01:32.128" v="1615"/>
-        <pc:sldMkLst>
-          <pc:docMk/>
-          <pc:sldMk cId="2930897821" sldId="413"/>
-        </pc:sldMkLst>
-        <pc:spChg chg="mod">
-          <ac:chgData name="Korochkina, Maria" userId="c909cca0-0566-42e0-8dc0-791f330c8ce2" providerId="ADAL" clId="{97825DE4-A198-468F-898D-C5BD5F984618}" dt="2025-10-14T16:46:14.925" v="1340" actId="20577"/>
-          <ac:spMkLst>
-            <pc:docMk/>
-            <pc:sldMk cId="2930897821" sldId="413"/>
-            <ac:spMk id="2" creationId="{F6AEAEDD-F656-0F56-CAFD-A4F2163F9349}"/>
-          </ac:spMkLst>
-        </pc:spChg>
-        <pc:spChg chg="add mod">
-          <ac:chgData name="Korochkina, Maria" userId="c909cca0-0566-42e0-8dc0-791f330c8ce2" providerId="ADAL" clId="{97825DE4-A198-468F-898D-C5BD5F984618}" dt="2025-10-14T17:01:32.128" v="1615"/>
-          <ac:spMkLst>
-            <pc:docMk/>
-            <pc:sldMk cId="2930897821" sldId="413"/>
-            <ac:spMk id="6" creationId="{CD1F43A9-F867-F61C-447A-6C4878064D60}"/>
-          </ac:spMkLst>
-        </pc:spChg>
-        <pc:picChg chg="add mod modCrop">
-          <ac:chgData name="Korochkina, Maria" userId="c909cca0-0566-42e0-8dc0-791f330c8ce2" providerId="ADAL" clId="{97825DE4-A198-468F-898D-C5BD5F984618}" dt="2025-10-14T16:44:43.071" v="1186" actId="1076"/>
-          <ac:picMkLst>
-            <pc:docMk/>
-            <pc:sldMk cId="2930897821" sldId="413"/>
-            <ac:picMk id="5" creationId="{F1043BD3-C024-9B4E-2404-5AA24681E551}"/>
-          </ac:picMkLst>
-        </pc:picChg>
-      </pc:sldChg>
-      <pc:sldChg chg="addSp modSp add mod">
-        <pc:chgData name="Korochkina, Maria" userId="c909cca0-0566-42e0-8dc0-791f330c8ce2" providerId="ADAL" clId="{97825DE4-A198-468F-898D-C5BD5F984618}" dt="2025-10-14T17:01:34.466" v="1616"/>
-        <pc:sldMkLst>
-          <pc:docMk/>
-          <pc:sldMk cId="3870575396" sldId="414"/>
-        </pc:sldMkLst>
-        <pc:spChg chg="add mod">
-          <ac:chgData name="Korochkina, Maria" userId="c909cca0-0566-42e0-8dc0-791f330c8ce2" providerId="ADAL" clId="{97825DE4-A198-468F-898D-C5BD5F984618}" dt="2025-10-14T17:01:34.466" v="1616"/>
-          <ac:spMkLst>
-            <pc:docMk/>
-            <pc:sldMk cId="3870575396" sldId="414"/>
-            <ac:spMk id="3" creationId="{7464CC08-E4D4-4F44-5D74-67CA894EDBF4}"/>
-          </ac:spMkLst>
-        </pc:spChg>
-        <pc:picChg chg="mod modCrop">
-          <ac:chgData name="Korochkina, Maria" userId="c909cca0-0566-42e0-8dc0-791f330c8ce2" providerId="ADAL" clId="{97825DE4-A198-468F-898D-C5BD5F984618}" dt="2025-10-14T16:46:36.487" v="1343" actId="732"/>
-          <ac:picMkLst>
-            <pc:docMk/>
-            <pc:sldMk cId="3870575396" sldId="414"/>
-            <ac:picMk id="5" creationId="{8B33185D-F142-A955-CADD-D0A324DB7242}"/>
-          </ac:picMkLst>
-        </pc:picChg>
-      </pc:sldChg>
-      <pc:sldChg chg="addSp delSp modSp add mod">
-        <pc:chgData name="Korochkina, Maria" userId="c909cca0-0566-42e0-8dc0-791f330c8ce2" providerId="ADAL" clId="{97825DE4-A198-468F-898D-C5BD5F984618}" dt="2025-10-14T17:01:24.309" v="1612"/>
-        <pc:sldMkLst>
-          <pc:docMk/>
-          <pc:sldMk cId="777016137" sldId="415"/>
-        </pc:sldMkLst>
-        <pc:spChg chg="add mod">
-          <ac:chgData name="Korochkina, Maria" userId="c909cca0-0566-42e0-8dc0-791f330c8ce2" providerId="ADAL" clId="{97825DE4-A198-468F-898D-C5BD5F984618}" dt="2025-10-14T17:01:24.309" v="1612"/>
-          <ac:spMkLst>
-            <pc:docMk/>
-            <pc:sldMk cId="777016137" sldId="415"/>
-            <ac:spMk id="7" creationId="{A5C4A519-3B2E-B946-F402-A6D3289E04F1}"/>
-          </ac:spMkLst>
-        </pc:spChg>
-        <pc:picChg chg="add mod modCrop">
-          <ac:chgData name="Korochkina, Maria" userId="c909cca0-0566-42e0-8dc0-791f330c8ce2" providerId="ADAL" clId="{97825DE4-A198-468F-898D-C5BD5F984618}" dt="2025-10-14T16:48:08.712" v="1354" actId="732"/>
-          <ac:picMkLst>
-            <pc:docMk/>
-            <pc:sldMk cId="777016137" sldId="415"/>
-            <ac:picMk id="6" creationId="{BE6121F1-80F6-2BF0-E705-3AF04065CC68}"/>
-          </ac:picMkLst>
-        </pc:picChg>
-      </pc:sldChg>
-      <pc:sldChg chg="addSp delSp modSp add mod">
-        <pc:chgData name="Korochkina, Maria" userId="c909cca0-0566-42e0-8dc0-791f330c8ce2" providerId="ADAL" clId="{97825DE4-A198-468F-898D-C5BD5F984618}" dt="2025-10-14T17:01:14.110" v="1610" actId="1076"/>
-        <pc:sldMkLst>
-          <pc:docMk/>
-          <pc:sldMk cId="384456303" sldId="416"/>
-        </pc:sldMkLst>
-        <pc:spChg chg="add mod">
-          <ac:chgData name="Korochkina, Maria" userId="c909cca0-0566-42e0-8dc0-791f330c8ce2" providerId="ADAL" clId="{97825DE4-A198-468F-898D-C5BD5F984618}" dt="2025-10-14T17:01:14.110" v="1610" actId="1076"/>
-          <ac:spMkLst>
-            <pc:docMk/>
-            <pc:sldMk cId="384456303" sldId="416"/>
-            <ac:spMk id="6" creationId="{51D2CAD3-4A40-BEBA-3A1A-F79579851F84}"/>
-          </ac:spMkLst>
-        </pc:spChg>
-        <pc:picChg chg="mod modCrop">
-          <ac:chgData name="Korochkina, Maria" userId="c909cca0-0566-42e0-8dc0-791f330c8ce2" providerId="ADAL" clId="{97825DE4-A198-468F-898D-C5BD5F984618}" dt="2025-10-14T16:47:54.468" v="1351" actId="1076"/>
-          <ac:picMkLst>
-            <pc:docMk/>
-            <pc:sldMk cId="384456303" sldId="416"/>
-            <ac:picMk id="4" creationId="{8A74621C-78ED-36F1-50B2-602C670860DF}"/>
-          </ac:picMkLst>
-        </pc:picChg>
-      </pc:sldChg>
-      <pc:sldChg chg="addSp delSp modSp add mod ord">
-        <pc:chgData name="Korochkina, Maria" userId="c909cca0-0566-42e0-8dc0-791f330c8ce2" providerId="ADAL" clId="{97825DE4-A198-468F-898D-C5BD5F984618}" dt="2025-10-14T17:04:02.938" v="1641"/>
-        <pc:sldMkLst>
-          <pc:docMk/>
-          <pc:sldMk cId="1046976902" sldId="417"/>
-        </pc:sldMkLst>
-        <pc:spChg chg="add mod">
-          <ac:chgData name="Korochkina, Maria" userId="c909cca0-0566-42e0-8dc0-791f330c8ce2" providerId="ADAL" clId="{97825DE4-A198-468F-898D-C5BD5F984618}" dt="2025-10-14T17:01:29.567" v="1614"/>
-          <ac:spMkLst>
-            <pc:docMk/>
-            <pc:sldMk cId="1046976902" sldId="417"/>
-            <ac:spMk id="6" creationId="{B25794C5-1BAF-AEBE-5292-D7C699AF31AA}"/>
-          </ac:spMkLst>
-        </pc:spChg>
-        <pc:picChg chg="add mod">
-          <ac:chgData name="Korochkina, Maria" userId="c909cca0-0566-42e0-8dc0-791f330c8ce2" providerId="ADAL" clId="{97825DE4-A198-468F-898D-C5BD5F984618}" dt="2025-10-14T17:04:02.938" v="1641"/>
-          <ac:picMkLst>
-            <pc:docMk/>
-            <pc:sldMk cId="1046976902" sldId="417"/>
-            <ac:picMk id="7" creationId="{DDA410F1-5B3B-DD33-B50F-5F327C15F180}"/>
-          </ac:picMkLst>
-        </pc:picChg>
-      </pc:sldChg>
-      <pc:sldChg chg="addSp delSp modSp add mod">
-        <pc:chgData name="Korochkina, Maria" userId="c909cca0-0566-42e0-8dc0-791f330c8ce2" providerId="ADAL" clId="{97825DE4-A198-468F-898D-C5BD5F984618}" dt="2025-10-14T17:03:55.104" v="1639" actId="1076"/>
-        <pc:sldMkLst>
-          <pc:docMk/>
-          <pc:sldMk cId="2202784894" sldId="418"/>
-        </pc:sldMkLst>
-        <pc:spChg chg="add mod">
-          <ac:chgData name="Korochkina, Maria" userId="c909cca0-0566-42e0-8dc0-791f330c8ce2" providerId="ADAL" clId="{97825DE4-A198-468F-898D-C5BD5F984618}" dt="2025-10-14T17:01:27.427" v="1613"/>
-          <ac:spMkLst>
-            <pc:docMk/>
-            <pc:sldMk cId="2202784894" sldId="418"/>
-            <ac:spMk id="6" creationId="{7246AF5E-0CD3-0F3D-32EF-1ACC3C3B0F04}"/>
-          </ac:spMkLst>
-        </pc:spChg>
-        <pc:picChg chg="add mod modCrop">
-          <ac:chgData name="Korochkina, Maria" userId="c909cca0-0566-42e0-8dc0-791f330c8ce2" providerId="ADAL" clId="{97825DE4-A198-468F-898D-C5BD5F984618}" dt="2025-10-14T17:03:55.104" v="1639" actId="1076"/>
-          <ac:picMkLst>
-            <pc:docMk/>
-            <pc:sldMk cId="2202784894" sldId="418"/>
-            <ac:picMk id="4" creationId="{69CD0879-2AC1-181F-70EF-8385D30B69BB}"/>
-          </ac:picMkLst>
-        </pc:picChg>
-        <pc:picChg chg="add mod">
-          <ac:chgData name="Korochkina, Maria" userId="c909cca0-0566-42e0-8dc0-791f330c8ce2" providerId="ADAL" clId="{97825DE4-A198-468F-898D-C5BD5F984618}" dt="2025-10-14T17:03:55.104" v="1639" actId="1076"/>
-          <ac:picMkLst>
-            <pc:docMk/>
-            <pc:sldMk cId="2202784894" sldId="418"/>
-            <ac:picMk id="7" creationId="{11D2C5DA-9B0E-0BD6-46CD-2EAF1345EBAD}"/>
-          </ac:picMkLst>
-        </pc:picChg>
-      </pc:sldChg>
-      <pc:sldChg chg="addSp delSp modSp add mod">
-        <pc:chgData name="Korochkina, Maria" userId="c909cca0-0566-42e0-8dc0-791f330c8ce2" providerId="ADAL" clId="{97825DE4-A198-468F-898D-C5BD5F984618}" dt="2025-10-14T17:01:20.937" v="1611"/>
-        <pc:sldMkLst>
-          <pc:docMk/>
-          <pc:sldMk cId="2199161051" sldId="419"/>
-        </pc:sldMkLst>
-        <pc:spChg chg="mod">
-          <ac:chgData name="Korochkina, Maria" userId="c909cca0-0566-42e0-8dc0-791f330c8ce2" providerId="ADAL" clId="{97825DE4-A198-468F-898D-C5BD5F984618}" dt="2025-10-14T16:59:07.429" v="1537" actId="20577"/>
-          <ac:spMkLst>
-            <pc:docMk/>
-            <pc:sldMk cId="2199161051" sldId="419"/>
-            <ac:spMk id="2" creationId="{51AE754A-1DB2-DE34-A1A7-DD74F5D2FEDA}"/>
-          </ac:spMkLst>
-        </pc:spChg>
-        <pc:spChg chg="add mod">
-          <ac:chgData name="Korochkina, Maria" userId="c909cca0-0566-42e0-8dc0-791f330c8ce2" providerId="ADAL" clId="{97825DE4-A198-468F-898D-C5BD5F984618}" dt="2025-10-14T17:01:20.937" v="1611"/>
-          <ac:spMkLst>
-            <pc:docMk/>
-            <pc:sldMk cId="2199161051" sldId="419"/>
-            <ac:spMk id="6" creationId="{085F16E4-A6CA-2D09-67DE-41425DE5685D}"/>
-          </ac:spMkLst>
-        </pc:spChg>
-        <pc:picChg chg="add mod modCrop">
-          <ac:chgData name="Korochkina, Maria" userId="c909cca0-0566-42e0-8dc0-791f330c8ce2" providerId="ADAL" clId="{97825DE4-A198-468F-898D-C5BD5F984618}" dt="2025-10-14T16:52:23.359" v="1387" actId="1076"/>
-          <ac:picMkLst>
-            <pc:docMk/>
-            <pc:sldMk cId="2199161051" sldId="419"/>
-            <ac:picMk id="5" creationId="{E635A41D-0902-C2F0-983A-A5AFF666C5C2}"/>
+            <pc:sldMk cId="1046865679" sldId="420"/>
+            <ac:picMk id="3" creationId="{393C93C6-9C2D-2E6B-80F9-E9E9F6171F1D}"/>
           </ac:picMkLst>
         </pc:picChg>
       </pc:sldChg>
@@ -706,7 +322,7 @@
           <a:p>
             <a:fld id="{565937AC-9840-43B4-9212-D00AD73B35EF}" type="datetimeFigureOut">
               <a:rPr lang="en-DE" smtClean="0"/>
-              <a:t>05/11/2025</a:t>
+              <a:t>18/11/2025</a:t>
             </a:fld>
             <a:endParaRPr lang="en-DE"/>
           </a:p>
@@ -906,7 +522,7 @@
           <a:p>
             <a:fld id="{565937AC-9840-43B4-9212-D00AD73B35EF}" type="datetimeFigureOut">
               <a:rPr lang="en-DE" smtClean="0"/>
-              <a:t>05/11/2025</a:t>
+              <a:t>18/11/2025</a:t>
             </a:fld>
             <a:endParaRPr lang="en-DE"/>
           </a:p>
@@ -1116,7 +732,7 @@
           <a:p>
             <a:fld id="{565937AC-9840-43B4-9212-D00AD73B35EF}" type="datetimeFigureOut">
               <a:rPr lang="en-DE" smtClean="0"/>
-              <a:t>05/11/2025</a:t>
+              <a:t>18/11/2025</a:t>
             </a:fld>
             <a:endParaRPr lang="en-DE"/>
           </a:p>
@@ -1316,7 +932,7 @@
           <a:p>
             <a:fld id="{565937AC-9840-43B4-9212-D00AD73B35EF}" type="datetimeFigureOut">
               <a:rPr lang="en-DE" smtClean="0"/>
-              <a:t>05/11/2025</a:t>
+              <a:t>18/11/2025</a:t>
             </a:fld>
             <a:endParaRPr lang="en-DE"/>
           </a:p>
@@ -1592,7 +1208,7 @@
           <a:p>
             <a:fld id="{565937AC-9840-43B4-9212-D00AD73B35EF}" type="datetimeFigureOut">
               <a:rPr lang="en-DE" smtClean="0"/>
-              <a:t>05/11/2025</a:t>
+              <a:t>18/11/2025</a:t>
             </a:fld>
             <a:endParaRPr lang="en-DE"/>
           </a:p>
@@ -1860,7 +1476,7 @@
           <a:p>
             <a:fld id="{565937AC-9840-43B4-9212-D00AD73B35EF}" type="datetimeFigureOut">
               <a:rPr lang="en-DE" smtClean="0"/>
-              <a:t>05/11/2025</a:t>
+              <a:t>18/11/2025</a:t>
             </a:fld>
             <a:endParaRPr lang="en-DE"/>
           </a:p>
@@ -2275,7 +1891,7 @@
           <a:p>
             <a:fld id="{565937AC-9840-43B4-9212-D00AD73B35EF}" type="datetimeFigureOut">
               <a:rPr lang="en-DE" smtClean="0"/>
-              <a:t>05/11/2025</a:t>
+              <a:t>18/11/2025</a:t>
             </a:fld>
             <a:endParaRPr lang="en-DE"/>
           </a:p>
@@ -2417,7 +2033,7 @@
           <a:p>
             <a:fld id="{565937AC-9840-43B4-9212-D00AD73B35EF}" type="datetimeFigureOut">
               <a:rPr lang="en-DE" smtClean="0"/>
-              <a:t>05/11/2025</a:t>
+              <a:t>18/11/2025</a:t>
             </a:fld>
             <a:endParaRPr lang="en-DE"/>
           </a:p>
@@ -2530,7 +2146,7 @@
           <a:p>
             <a:fld id="{565937AC-9840-43B4-9212-D00AD73B35EF}" type="datetimeFigureOut">
               <a:rPr lang="en-DE" smtClean="0"/>
-              <a:t>05/11/2025</a:t>
+              <a:t>18/11/2025</a:t>
             </a:fld>
             <a:endParaRPr lang="en-DE"/>
           </a:p>
@@ -2843,7 +2459,7 @@
           <a:p>
             <a:fld id="{565937AC-9840-43B4-9212-D00AD73B35EF}" type="datetimeFigureOut">
               <a:rPr lang="en-DE" smtClean="0"/>
-              <a:t>05/11/2025</a:t>
+              <a:t>18/11/2025</a:t>
             </a:fld>
             <a:endParaRPr lang="en-DE"/>
           </a:p>
@@ -3132,7 +2748,7 @@
           <a:p>
             <a:fld id="{565937AC-9840-43B4-9212-D00AD73B35EF}" type="datetimeFigureOut">
               <a:rPr lang="en-DE" smtClean="0"/>
-              <a:t>05/11/2025</a:t>
+              <a:t>18/11/2025</a:t>
             </a:fld>
             <a:endParaRPr lang="en-DE"/>
           </a:p>
@@ -3375,7 +2991,7 @@
           <a:p>
             <a:fld id="{565937AC-9840-43B4-9212-D00AD73B35EF}" type="datetimeFigureOut">
               <a:rPr lang="en-DE" smtClean="0"/>
-              <a:t>05/11/2025</a:t>
+              <a:t>18/11/2025</a:t>
             </a:fld>
             <a:endParaRPr lang="en-DE"/>
           </a:p>
@@ -5095,6 +4711,66 @@
     <p:extLst>
       <p:ext uri="{BB962C8B-B14F-4D97-AF65-F5344CB8AC3E}">
         <p14:creationId xmlns:p14="http://schemas.microsoft.com/office/powerpoint/2010/main" val="3564412488"/>
+      </p:ext>
+    </p:extLst>
+  </p:cSld>
+  <p:clrMapOvr>
+    <a:masterClrMapping/>
+  </p:clrMapOvr>
+</p:sld>
+</file>
+
+<file path=ppt/slides/slide18.xml><?xml version="1.0" encoding="utf-8"?>
+<p:sld xmlns:a="http://schemas.openxmlformats.org/drawingml/2006/main" xmlns:r="http://schemas.openxmlformats.org/officeDocument/2006/relationships" xmlns:p="http://schemas.openxmlformats.org/presentationml/2006/main">
+  <p:cSld>
+    <p:spTree>
+      <p:nvGrpSpPr>
+        <p:cNvPr id="1" name=""/>
+        <p:cNvGrpSpPr/>
+        <p:nvPr/>
+      </p:nvGrpSpPr>
+      <p:grpSpPr>
+        <a:xfrm>
+          <a:off x="0" y="0"/>
+          <a:ext cx="0" cy="0"/>
+          <a:chOff x="0" y="0"/>
+          <a:chExt cx="0" cy="0"/>
+        </a:xfrm>
+      </p:grpSpPr>
+      <p:pic>
+        <p:nvPicPr>
+          <p:cNvPr id="3" name="Picture 2">
+            <a:extLst>
+              <a:ext uri="{FF2B5EF4-FFF2-40B4-BE49-F238E27FC236}">
+                <a16:creationId xmlns:a16="http://schemas.microsoft.com/office/drawing/2014/main" id="{393C93C6-9C2D-2E6B-80F9-E9E9F6171F1D}"/>
+              </a:ext>
+            </a:extLst>
+          </p:cNvPr>
+          <p:cNvPicPr>
+            <a:picLocks noChangeAspect="1"/>
+          </p:cNvPicPr>
+          <p:nvPr/>
+        </p:nvPicPr>
+        <p:blipFill>
+          <a:blip r:embed="rId2"/>
+          <a:stretch>
+            <a:fillRect/>
+          </a:stretch>
+        </p:blipFill>
+        <p:spPr>
+          <a:xfrm>
+            <a:off x="1288376" y="0"/>
+            <a:ext cx="9615248" cy="6858000"/>
+          </a:xfrm>
+          <a:prstGeom prst="rect">
+            <a:avLst/>
+          </a:prstGeom>
+        </p:spPr>
+      </p:pic>
+    </p:spTree>
+    <p:extLst>
+      <p:ext uri="{BB962C8B-B14F-4D97-AF65-F5344CB8AC3E}">
+        <p14:creationId xmlns:p14="http://schemas.microsoft.com/office/powerpoint/2010/main" val="1046865679"/>
       </p:ext>
     </p:extLst>
   </p:cSld>

</xml_diff>

<commit_message>
Removed InkPath QR code
</commit_message>
<xml_diff>
--- a/Intro_to_Data_Vis_in_R_slides.pptx
+++ b/Intro_to_Data_Vis_in_R_slides.pptx
@@ -22,7 +22,6 @@
     <p:sldId id="410" r:id="rId16"/>
     <p:sldId id="375" r:id="rId17"/>
     <p:sldId id="405" r:id="rId18"/>
-    <p:sldId id="420" r:id="rId19"/>
   </p:sldIdLst>
   <p:sldSz cx="12192000" cy="6858000"/>
   <p:notesSz cx="6858000" cy="9144000"/>
@@ -134,7 +133,7 @@
   <pc:docChgLst>
     <pc:chgData name="Korochkina, Maria" userId="c909cca0-0566-42e0-8dc0-791f330c8ce2" providerId="ADAL" clId="{97825DE4-A198-468F-898D-C5BD5F984618}"/>
     <pc:docChg chg="undo custSel addSld delSld modSld sldOrd">
-      <pc:chgData name="Korochkina, Maria" userId="c909cca0-0566-42e0-8dc0-791f330c8ce2" providerId="ADAL" clId="{97825DE4-A198-468F-898D-C5BD5F984618}" dt="2025-11-19T12:20:33.872" v="1661"/>
+      <pc:chgData name="Korochkina, Maria" userId="c909cca0-0566-42e0-8dc0-791f330c8ce2" providerId="ADAL" clId="{97825DE4-A198-468F-898D-C5BD5F984618}" dt="2025-11-19T17:13:51.700" v="1662" actId="47"/>
       <pc:docMkLst>
         <pc:docMk/>
       </pc:docMkLst>
@@ -160,8 +159,8 @@
           <pc:sldMk cId="461221306" sldId="410"/>
         </pc:sldMkLst>
       </pc:sldChg>
-      <pc:sldChg chg="addSp modSp new mod">
-        <pc:chgData name="Korochkina, Maria" userId="c909cca0-0566-42e0-8dc0-791f330c8ce2" providerId="ADAL" clId="{97825DE4-A198-468F-898D-C5BD5F984618}" dt="2025-11-18T09:42:41.592" v="1659" actId="14100"/>
+      <pc:sldChg chg="addSp modSp new del mod">
+        <pc:chgData name="Korochkina, Maria" userId="c909cca0-0566-42e0-8dc0-791f330c8ce2" providerId="ADAL" clId="{97825DE4-A198-468F-898D-C5BD5F984618}" dt="2025-11-19T17:13:51.700" v="1662" actId="47"/>
         <pc:sldMkLst>
           <pc:docMk/>
           <pc:sldMk cId="1046865679" sldId="420"/>
@@ -5460,66 +5459,6 @@
 </p:sld>
 </file>
 
-<file path=ppt/slides/slide18.xml><?xml version="1.0" encoding="utf-8"?>
-<p:sld xmlns:a="http://schemas.openxmlformats.org/drawingml/2006/main" xmlns:r="http://schemas.openxmlformats.org/officeDocument/2006/relationships" xmlns:p="http://schemas.openxmlformats.org/presentationml/2006/main">
-  <p:cSld>
-    <p:spTree>
-      <p:nvGrpSpPr>
-        <p:cNvPr id="1" name=""/>
-        <p:cNvGrpSpPr/>
-        <p:nvPr/>
-      </p:nvGrpSpPr>
-      <p:grpSpPr>
-        <a:xfrm>
-          <a:off x="0" y="0"/>
-          <a:ext cx="0" cy="0"/>
-          <a:chOff x="0" y="0"/>
-          <a:chExt cx="0" cy="0"/>
-        </a:xfrm>
-      </p:grpSpPr>
-      <p:pic>
-        <p:nvPicPr>
-          <p:cNvPr id="3" name="Picture 2">
-            <a:extLst>
-              <a:ext uri="{FF2B5EF4-FFF2-40B4-BE49-F238E27FC236}">
-                <a16:creationId xmlns:a16="http://schemas.microsoft.com/office/drawing/2014/main" id="{393C93C6-9C2D-2E6B-80F9-E9E9F6171F1D}"/>
-              </a:ext>
-            </a:extLst>
-          </p:cNvPr>
-          <p:cNvPicPr>
-            <a:picLocks noChangeAspect="1"/>
-          </p:cNvPicPr>
-          <p:nvPr/>
-        </p:nvPicPr>
-        <p:blipFill>
-          <a:blip r:embed="rId2"/>
-          <a:stretch>
-            <a:fillRect/>
-          </a:stretch>
-        </p:blipFill>
-        <p:spPr>
-          <a:xfrm>
-            <a:off x="1288376" y="0"/>
-            <a:ext cx="9615248" cy="6858000"/>
-          </a:xfrm>
-          <a:prstGeom prst="rect">
-            <a:avLst/>
-          </a:prstGeom>
-        </p:spPr>
-      </p:pic>
-    </p:spTree>
-    <p:extLst>
-      <p:ext uri="{BB962C8B-B14F-4D97-AF65-F5344CB8AC3E}">
-        <p14:creationId xmlns:p14="http://schemas.microsoft.com/office/powerpoint/2010/main" val="1046865679"/>
-      </p:ext>
-    </p:extLst>
-  </p:cSld>
-  <p:clrMapOvr>
-    <a:masterClrMapping/>
-  </p:clrMapOvr>
-</p:sld>
-</file>
-
 <file path=ppt/slides/slide2.xml><?xml version="1.0" encoding="utf-8"?>
 <p:sld xmlns:a="http://schemas.openxmlformats.org/drawingml/2006/main" xmlns:r="http://schemas.openxmlformats.org/officeDocument/2006/relationships" xmlns:p="http://schemas.openxmlformats.org/presentationml/2006/main">
   <p:cSld>

</xml_diff>